<commit_message>
4.2.0.0 - Updated ymfm engine to latest. ymfm is used for OPZ, OPQ, OPN2, OPLL. - Supported YM3806(aka OPQ) chip. YM3806(YM3533) is used by PORTATONE PSR-70. - Fixed some minor bugs for OPM,OPZ.
</commit_message>
<xml_diff>
--- a/src/mamidimemo/Data/ALG.pptx
+++ b/src/mamidimemo/Data/ALG.pptx
@@ -17,6 +17,8 @@
     <p:sldId id="270" r:id="rId11"/>
     <p:sldId id="271" r:id="rId12"/>
     <p:sldId id="272" r:id="rId13"/>
+    <p:sldId id="273" r:id="rId14"/>
+    <p:sldId id="274" r:id="rId15"/>
   </p:sldIdLst>
   <p:sldSz cx="12192000" cy="6858000"/>
   <p:notesSz cx="6858000" cy="9144000"/>
@@ -270,7 +272,7 @@
           <a:p>
             <a:fld id="{5B3D61BB-EC70-4444-81C6-89E6C6837D74}" type="datetimeFigureOut">
               <a:rPr kumimoji="1" lang="ja-JP" altLang="en-US" smtClean="0"/>
-              <a:t>2021/1/28</a:t>
+              <a:t>2022/7/23</a:t>
             </a:fld>
             <a:endParaRPr kumimoji="1" lang="ja-JP" altLang="en-US"/>
           </a:p>
@@ -500,7 +502,7 @@
           <a:p>
             <a:fld id="{5B3D61BB-EC70-4444-81C6-89E6C6837D74}" type="datetimeFigureOut">
               <a:rPr kumimoji="1" lang="ja-JP" altLang="en-US" smtClean="0"/>
-              <a:t>2021/1/28</a:t>
+              <a:t>2022/7/23</a:t>
             </a:fld>
             <a:endParaRPr kumimoji="1" lang="ja-JP" altLang="en-US"/>
           </a:p>
@@ -740,7 +742,7 @@
           <a:p>
             <a:fld id="{5B3D61BB-EC70-4444-81C6-89E6C6837D74}" type="datetimeFigureOut">
               <a:rPr kumimoji="1" lang="ja-JP" altLang="en-US" smtClean="0"/>
-              <a:t>2021/1/28</a:t>
+              <a:t>2022/7/23</a:t>
             </a:fld>
             <a:endParaRPr kumimoji="1" lang="ja-JP" altLang="en-US"/>
           </a:p>
@@ -970,7 +972,7 @@
           <a:p>
             <a:fld id="{5B3D61BB-EC70-4444-81C6-89E6C6837D74}" type="datetimeFigureOut">
               <a:rPr kumimoji="1" lang="ja-JP" altLang="en-US" smtClean="0"/>
-              <a:t>2021/1/28</a:t>
+              <a:t>2022/7/23</a:t>
             </a:fld>
             <a:endParaRPr kumimoji="1" lang="ja-JP" altLang="en-US"/>
           </a:p>
@@ -1245,7 +1247,7 @@
           <a:p>
             <a:fld id="{5B3D61BB-EC70-4444-81C6-89E6C6837D74}" type="datetimeFigureOut">
               <a:rPr kumimoji="1" lang="ja-JP" altLang="en-US" smtClean="0"/>
-              <a:t>2021/1/28</a:t>
+              <a:t>2022/7/23</a:t>
             </a:fld>
             <a:endParaRPr kumimoji="1" lang="ja-JP" altLang="en-US"/>
           </a:p>
@@ -1574,7 +1576,7 @@
           <a:p>
             <a:fld id="{5B3D61BB-EC70-4444-81C6-89E6C6837D74}" type="datetimeFigureOut">
               <a:rPr kumimoji="1" lang="ja-JP" altLang="en-US" smtClean="0"/>
-              <a:t>2021/1/28</a:t>
+              <a:t>2022/7/23</a:t>
             </a:fld>
             <a:endParaRPr kumimoji="1" lang="ja-JP" altLang="en-US"/>
           </a:p>
@@ -2050,7 +2052,7 @@
           <a:p>
             <a:fld id="{5B3D61BB-EC70-4444-81C6-89E6C6837D74}" type="datetimeFigureOut">
               <a:rPr kumimoji="1" lang="ja-JP" altLang="en-US" smtClean="0"/>
-              <a:t>2021/1/28</a:t>
+              <a:t>2022/7/23</a:t>
             </a:fld>
             <a:endParaRPr kumimoji="1" lang="ja-JP" altLang="en-US"/>
           </a:p>
@@ -2191,7 +2193,7 @@
           <a:p>
             <a:fld id="{5B3D61BB-EC70-4444-81C6-89E6C6837D74}" type="datetimeFigureOut">
               <a:rPr kumimoji="1" lang="ja-JP" altLang="en-US" smtClean="0"/>
-              <a:t>2021/1/28</a:t>
+              <a:t>2022/7/23</a:t>
             </a:fld>
             <a:endParaRPr kumimoji="1" lang="ja-JP" altLang="en-US"/>
           </a:p>
@@ -2304,7 +2306,7 @@
           <a:p>
             <a:fld id="{5B3D61BB-EC70-4444-81C6-89E6C6837D74}" type="datetimeFigureOut">
               <a:rPr kumimoji="1" lang="ja-JP" altLang="en-US" smtClean="0"/>
-              <a:t>2021/1/28</a:t>
+              <a:t>2022/7/23</a:t>
             </a:fld>
             <a:endParaRPr kumimoji="1" lang="ja-JP" altLang="en-US"/>
           </a:p>
@@ -2647,7 +2649,7 @@
           <a:p>
             <a:fld id="{5B3D61BB-EC70-4444-81C6-89E6C6837D74}" type="datetimeFigureOut">
               <a:rPr kumimoji="1" lang="ja-JP" altLang="en-US" smtClean="0"/>
-              <a:t>2021/1/28</a:t>
+              <a:t>2022/7/23</a:t>
             </a:fld>
             <a:endParaRPr kumimoji="1" lang="ja-JP" altLang="en-US"/>
           </a:p>
@@ -2935,7 +2937,7 @@
           <a:p>
             <a:fld id="{5B3D61BB-EC70-4444-81C6-89E6C6837D74}" type="datetimeFigureOut">
               <a:rPr kumimoji="1" lang="ja-JP" altLang="en-US" smtClean="0"/>
-              <a:t>2021/1/28</a:t>
+              <a:t>2022/7/23</a:t>
             </a:fld>
             <a:endParaRPr kumimoji="1" lang="ja-JP" altLang="en-US"/>
           </a:p>
@@ -3208,7 +3210,7 @@
           <a:p>
             <a:fld id="{5B3D61BB-EC70-4444-81C6-89E6C6837D74}" type="datetimeFigureOut">
               <a:rPr kumimoji="1" lang="ja-JP" altLang="en-US" smtClean="0"/>
-              <a:t>2021/1/28</a:t>
+              <a:t>2022/7/23</a:t>
             </a:fld>
             <a:endParaRPr kumimoji="1" lang="ja-JP" altLang="en-US"/>
           </a:p>
@@ -6477,6 +6479,1589 @@
     <p:extLst>
       <p:ext uri="{BB962C8B-B14F-4D97-AF65-F5344CB8AC3E}">
         <p14:creationId xmlns:p14="http://schemas.microsoft.com/office/powerpoint/2010/main" val="4152142636"/>
+      </p:ext>
+    </p:extLst>
+  </p:cSld>
+  <p:clrMapOvr>
+    <a:masterClrMapping/>
+  </p:clrMapOvr>
+</p:sld>
+</file>
+
+<file path=ppt/slides/slide13.xml><?xml version="1.0" encoding="utf-8"?>
+<p:sld xmlns:a="http://schemas.openxmlformats.org/drawingml/2006/main" xmlns:r="http://schemas.openxmlformats.org/officeDocument/2006/relationships" xmlns:p="http://schemas.openxmlformats.org/presentationml/2006/main">
+  <p:cSld>
+    <p:spTree>
+      <p:nvGrpSpPr>
+        <p:cNvPr id="1" name=""/>
+        <p:cNvGrpSpPr/>
+        <p:nvPr/>
+      </p:nvGrpSpPr>
+      <p:grpSpPr>
+        <a:xfrm>
+          <a:off x="0" y="0"/>
+          <a:ext cx="0" cy="0"/>
+          <a:chOff x="0" y="0"/>
+          <a:chExt cx="0" cy="0"/>
+        </a:xfrm>
+      </p:grpSpPr>
+      <p:sp>
+        <p:nvSpPr>
+          <p:cNvPr id="5" name="正方形/長方形 4">
+            <a:extLst>
+              <a:ext uri="{FF2B5EF4-FFF2-40B4-BE49-F238E27FC236}">
+                <a16:creationId xmlns:a16="http://schemas.microsoft.com/office/drawing/2014/main" id="{2945E7BB-73F3-4FED-9A34-2574AC1448F5}"/>
+              </a:ext>
+            </a:extLst>
+          </p:cNvPr>
+          <p:cNvSpPr/>
+          <p:nvPr/>
+        </p:nvSpPr>
+        <p:spPr>
+          <a:xfrm>
+            <a:off x="644108" y="2682813"/>
+            <a:ext cx="1793672" cy="1268083"/>
+          </a:xfrm>
+          <a:prstGeom prst="rect">
+            <a:avLst/>
+          </a:prstGeom>
+          <a:effectLst>
+            <a:outerShdw blurRad="50800" dist="38100" dir="2700000" algn="tl" rotWithShape="0">
+              <a:prstClr val="black">
+                <a:alpha val="40000"/>
+              </a:prstClr>
+            </a:outerShdw>
+          </a:effectLst>
+        </p:spPr>
+        <p:style>
+          <a:lnRef idx="0">
+            <a:schemeClr val="accent5"/>
+          </a:lnRef>
+          <a:fillRef idx="3">
+            <a:schemeClr val="accent5"/>
+          </a:fillRef>
+          <a:effectRef idx="3">
+            <a:schemeClr val="accent5"/>
+          </a:effectRef>
+          <a:fontRef idx="minor">
+            <a:schemeClr val="lt1"/>
+          </a:fontRef>
+        </p:style>
+        <p:txBody>
+          <a:bodyPr rtlCol="0" anchor="ctr"/>
+          <a:lstStyle/>
+          <a:p>
+            <a:pPr algn="ctr"/>
+            <a:r>
+              <a:rPr kumimoji="1" lang="en-US" altLang="ja-JP" sz="8000" b="1" dirty="0">
+                <a:latin typeface="UD デジタル 教科書体 NK-B" panose="02020700000000000000" pitchFamily="18" charset="-128"/>
+                <a:ea typeface="UD デジタル 教科書体 NK-B" panose="02020700000000000000" pitchFamily="18" charset="-128"/>
+              </a:rPr>
+              <a:t>1</a:t>
+            </a:r>
+            <a:endParaRPr kumimoji="1" lang="ja-JP" altLang="en-US" sz="8000" b="1" dirty="0">
+              <a:latin typeface="UD デジタル 教科書体 NK-B" panose="02020700000000000000" pitchFamily="18" charset="-128"/>
+              <a:ea typeface="UD デジタル 教科書体 NK-B" panose="02020700000000000000" pitchFamily="18" charset="-128"/>
+            </a:endParaRPr>
+          </a:p>
+        </p:txBody>
+      </p:sp>
+      <p:sp>
+        <p:nvSpPr>
+          <p:cNvPr id="6" name="正方形/長方形 5">
+            <a:extLst>
+              <a:ext uri="{FF2B5EF4-FFF2-40B4-BE49-F238E27FC236}">
+                <a16:creationId xmlns:a16="http://schemas.microsoft.com/office/drawing/2014/main" id="{BCBB86A7-685E-433C-BF57-F4DA793F3E0F}"/>
+              </a:ext>
+            </a:extLst>
+          </p:cNvPr>
+          <p:cNvSpPr/>
+          <p:nvPr/>
+        </p:nvSpPr>
+        <p:spPr>
+          <a:xfrm>
+            <a:off x="3470963" y="2682813"/>
+            <a:ext cx="1793672" cy="1268083"/>
+          </a:xfrm>
+          <a:prstGeom prst="rect">
+            <a:avLst/>
+          </a:prstGeom>
+          <a:effectLst>
+            <a:outerShdw blurRad="50800" dist="38100" dir="2700000" algn="tl" rotWithShape="0">
+              <a:prstClr val="black">
+                <a:alpha val="40000"/>
+              </a:prstClr>
+            </a:outerShdw>
+          </a:effectLst>
+        </p:spPr>
+        <p:style>
+          <a:lnRef idx="0">
+            <a:schemeClr val="accent5"/>
+          </a:lnRef>
+          <a:fillRef idx="3">
+            <a:schemeClr val="accent5"/>
+          </a:fillRef>
+          <a:effectRef idx="3">
+            <a:schemeClr val="accent5"/>
+          </a:effectRef>
+          <a:fontRef idx="minor">
+            <a:schemeClr val="lt1"/>
+          </a:fontRef>
+        </p:style>
+        <p:txBody>
+          <a:bodyPr rtlCol="0" anchor="ctr"/>
+          <a:lstStyle/>
+          <a:p>
+            <a:pPr algn="ctr"/>
+            <a:r>
+              <a:rPr kumimoji="1" lang="en-US" altLang="ja-JP" sz="8000" b="1" dirty="0">
+                <a:latin typeface="UD デジタル 教科書体 NK-B" panose="02020700000000000000" pitchFamily="18" charset="-128"/>
+                <a:ea typeface="UD デジタル 教科書体 NK-B" panose="02020700000000000000" pitchFamily="18" charset="-128"/>
+              </a:rPr>
+              <a:t>3</a:t>
+            </a:r>
+            <a:endParaRPr kumimoji="1" lang="ja-JP" altLang="en-US" sz="8000" b="1" dirty="0">
+              <a:latin typeface="UD デジタル 教科書体 NK-B" panose="02020700000000000000" pitchFamily="18" charset="-128"/>
+              <a:ea typeface="UD デジタル 教科書体 NK-B" panose="02020700000000000000" pitchFamily="18" charset="-128"/>
+            </a:endParaRPr>
+          </a:p>
+        </p:txBody>
+      </p:sp>
+      <p:cxnSp>
+        <p:nvCxnSpPr>
+          <p:cNvPr id="10" name="直線矢印コネクタ 9">
+            <a:extLst>
+              <a:ext uri="{FF2B5EF4-FFF2-40B4-BE49-F238E27FC236}">
+                <a16:creationId xmlns:a16="http://schemas.microsoft.com/office/drawing/2014/main" id="{A185368D-B39C-478A-96EB-C5DCFBBCA086}"/>
+              </a:ext>
+            </a:extLst>
+          </p:cNvPr>
+          <p:cNvCxnSpPr>
+            <a:cxnSpLocks/>
+            <a:stCxn id="5" idx="3"/>
+            <a:endCxn id="6" idx="1"/>
+          </p:cNvCxnSpPr>
+          <p:nvPr/>
+        </p:nvCxnSpPr>
+        <p:spPr>
+          <a:xfrm>
+            <a:off x="2437780" y="3316855"/>
+            <a:ext cx="1033183" cy="0"/>
+          </a:xfrm>
+          <a:prstGeom prst="straightConnector1">
+            <a:avLst/>
+          </a:prstGeom>
+          <a:ln w="76200" cap="flat" cmpd="sng" algn="ctr">
+            <a:solidFill>
+              <a:schemeClr val="tx1"/>
+            </a:solidFill>
+            <a:prstDash val="solid"/>
+            <a:round/>
+            <a:headEnd type="none" w="med" len="med"/>
+            <a:tailEnd type="triangle" w="med" len="med"/>
+          </a:ln>
+          <a:effectLst>
+            <a:outerShdw blurRad="50800" dist="38100" dir="2700000" algn="tl" rotWithShape="0">
+              <a:prstClr val="black">
+                <a:alpha val="40000"/>
+              </a:prstClr>
+            </a:outerShdw>
+          </a:effectLst>
+        </p:spPr>
+        <p:style>
+          <a:lnRef idx="0">
+            <a:scrgbClr r="0" g="0" b="0"/>
+          </a:lnRef>
+          <a:fillRef idx="0">
+            <a:scrgbClr r="0" g="0" b="0"/>
+          </a:fillRef>
+          <a:effectRef idx="0">
+            <a:scrgbClr r="0" g="0" b="0"/>
+          </a:effectRef>
+          <a:fontRef idx="minor">
+            <a:schemeClr val="tx1"/>
+          </a:fontRef>
+        </p:style>
+      </p:cxnSp>
+      <p:cxnSp>
+        <p:nvCxnSpPr>
+          <p:cNvPr id="11" name="直線矢印コネクタ 10">
+            <a:extLst>
+              <a:ext uri="{FF2B5EF4-FFF2-40B4-BE49-F238E27FC236}">
+                <a16:creationId xmlns:a16="http://schemas.microsoft.com/office/drawing/2014/main" id="{43282CBD-81DC-4827-8842-D09BC42EE984}"/>
+              </a:ext>
+            </a:extLst>
+          </p:cNvPr>
+          <p:cNvCxnSpPr>
+            <a:cxnSpLocks/>
+            <a:stCxn id="6" idx="3"/>
+          </p:cNvCxnSpPr>
+          <p:nvPr/>
+        </p:nvCxnSpPr>
+        <p:spPr>
+          <a:xfrm>
+            <a:off x="5264635" y="3316855"/>
+            <a:ext cx="2131078" cy="0"/>
+          </a:xfrm>
+          <a:prstGeom prst="straightConnector1">
+            <a:avLst/>
+          </a:prstGeom>
+          <a:ln w="76200" cap="flat" cmpd="sng" algn="ctr">
+            <a:solidFill>
+              <a:schemeClr val="tx1"/>
+            </a:solidFill>
+            <a:prstDash val="solid"/>
+            <a:round/>
+            <a:headEnd type="none" w="med" len="med"/>
+            <a:tailEnd type="triangle" w="med" len="med"/>
+          </a:ln>
+          <a:effectLst>
+            <a:outerShdw blurRad="50800" dist="38100" dir="2700000" algn="tl" rotWithShape="0">
+              <a:prstClr val="black">
+                <a:alpha val="40000"/>
+              </a:prstClr>
+            </a:outerShdw>
+          </a:effectLst>
+        </p:spPr>
+        <p:style>
+          <a:lnRef idx="0">
+            <a:scrgbClr r="0" g="0" b="0"/>
+          </a:lnRef>
+          <a:fillRef idx="0">
+            <a:scrgbClr r="0" g="0" b="0"/>
+          </a:fillRef>
+          <a:effectRef idx="0">
+            <a:scrgbClr r="0" g="0" b="0"/>
+          </a:effectRef>
+          <a:fontRef idx="minor">
+            <a:schemeClr val="tx1"/>
+          </a:fontRef>
+        </p:style>
+      </p:cxnSp>
+      <p:cxnSp>
+        <p:nvCxnSpPr>
+          <p:cNvPr id="39" name="直線矢印コネクタ 38">
+            <a:extLst>
+              <a:ext uri="{FF2B5EF4-FFF2-40B4-BE49-F238E27FC236}">
+                <a16:creationId xmlns:a16="http://schemas.microsoft.com/office/drawing/2014/main" id="{33F04FCE-1F02-40B5-86BE-26E07F37F91F}"/>
+              </a:ext>
+            </a:extLst>
+          </p:cNvPr>
+          <p:cNvCxnSpPr>
+            <a:cxnSpLocks/>
+          </p:cNvCxnSpPr>
+          <p:nvPr/>
+        </p:nvCxnSpPr>
+        <p:spPr>
+          <a:xfrm flipV="1">
+            <a:off x="2940602" y="2241162"/>
+            <a:ext cx="0" cy="1075694"/>
+          </a:xfrm>
+          <a:prstGeom prst="straightConnector1">
+            <a:avLst/>
+          </a:prstGeom>
+          <a:ln w="76200" cap="flat" cmpd="sng" algn="ctr">
+            <a:solidFill>
+              <a:schemeClr val="tx1"/>
+            </a:solidFill>
+            <a:prstDash val="solid"/>
+            <a:round/>
+            <a:headEnd type="none" w="med" len="med"/>
+            <a:tailEnd type="none" w="med" len="med"/>
+          </a:ln>
+          <a:effectLst>
+            <a:outerShdw blurRad="50800" dist="38100" dir="2700000" algn="tl" rotWithShape="0">
+              <a:prstClr val="black">
+                <a:alpha val="40000"/>
+              </a:prstClr>
+            </a:outerShdw>
+          </a:effectLst>
+        </p:spPr>
+        <p:style>
+          <a:lnRef idx="0">
+            <a:scrgbClr r="0" g="0" b="0"/>
+          </a:lnRef>
+          <a:fillRef idx="0">
+            <a:scrgbClr r="0" g="0" b="0"/>
+          </a:fillRef>
+          <a:effectRef idx="0">
+            <a:scrgbClr r="0" g="0" b="0"/>
+          </a:effectRef>
+          <a:fontRef idx="minor">
+            <a:schemeClr val="tx1"/>
+          </a:fontRef>
+        </p:style>
+      </p:cxnSp>
+      <p:cxnSp>
+        <p:nvCxnSpPr>
+          <p:cNvPr id="42" name="直線矢印コネクタ 41">
+            <a:extLst>
+              <a:ext uri="{FF2B5EF4-FFF2-40B4-BE49-F238E27FC236}">
+                <a16:creationId xmlns:a16="http://schemas.microsoft.com/office/drawing/2014/main" id="{DE69DE8A-FEE5-499D-A848-DEC3D15E6DC9}"/>
+              </a:ext>
+            </a:extLst>
+          </p:cNvPr>
+          <p:cNvCxnSpPr>
+            <a:cxnSpLocks/>
+          </p:cNvCxnSpPr>
+          <p:nvPr/>
+        </p:nvCxnSpPr>
+        <p:spPr>
+          <a:xfrm flipH="1">
+            <a:off x="201283" y="2277373"/>
+            <a:ext cx="2770517" cy="1"/>
+          </a:xfrm>
+          <a:prstGeom prst="straightConnector1">
+            <a:avLst/>
+          </a:prstGeom>
+          <a:ln w="76200" cap="flat" cmpd="sng" algn="ctr">
+            <a:solidFill>
+              <a:schemeClr val="tx1"/>
+            </a:solidFill>
+            <a:prstDash val="solid"/>
+            <a:round/>
+            <a:headEnd type="none" w="med" len="med"/>
+            <a:tailEnd type="none" w="med" len="med"/>
+          </a:ln>
+          <a:effectLst>
+            <a:outerShdw blurRad="50800" dist="38100" dir="2700000" algn="tl" rotWithShape="0">
+              <a:prstClr val="black">
+                <a:alpha val="40000"/>
+              </a:prstClr>
+            </a:outerShdw>
+          </a:effectLst>
+        </p:spPr>
+        <p:style>
+          <a:lnRef idx="0">
+            <a:scrgbClr r="0" g="0" b="0"/>
+          </a:lnRef>
+          <a:fillRef idx="0">
+            <a:scrgbClr r="0" g="0" b="0"/>
+          </a:fillRef>
+          <a:effectRef idx="0">
+            <a:scrgbClr r="0" g="0" b="0"/>
+          </a:effectRef>
+          <a:fontRef idx="minor">
+            <a:schemeClr val="tx1"/>
+          </a:fontRef>
+        </p:style>
+      </p:cxnSp>
+      <p:cxnSp>
+        <p:nvCxnSpPr>
+          <p:cNvPr id="45" name="直線矢印コネクタ 44">
+            <a:extLst>
+              <a:ext uri="{FF2B5EF4-FFF2-40B4-BE49-F238E27FC236}">
+                <a16:creationId xmlns:a16="http://schemas.microsoft.com/office/drawing/2014/main" id="{19CED10B-C49D-4E17-9E9F-D9E6C58E7685}"/>
+              </a:ext>
+            </a:extLst>
+          </p:cNvPr>
+          <p:cNvCxnSpPr>
+            <a:cxnSpLocks/>
+          </p:cNvCxnSpPr>
+          <p:nvPr/>
+        </p:nvCxnSpPr>
+        <p:spPr>
+          <a:xfrm>
+            <a:off x="201283" y="2241161"/>
+            <a:ext cx="0" cy="1117390"/>
+          </a:xfrm>
+          <a:prstGeom prst="straightConnector1">
+            <a:avLst/>
+          </a:prstGeom>
+          <a:ln w="76200" cap="flat" cmpd="sng" algn="ctr">
+            <a:solidFill>
+              <a:schemeClr val="tx1"/>
+            </a:solidFill>
+            <a:prstDash val="solid"/>
+            <a:round/>
+            <a:headEnd type="none" w="med" len="med"/>
+            <a:tailEnd type="none" w="med" len="med"/>
+          </a:ln>
+          <a:effectLst>
+            <a:outerShdw blurRad="50800" dist="38100" dir="2700000" algn="tl" rotWithShape="0">
+              <a:prstClr val="black">
+                <a:alpha val="40000"/>
+              </a:prstClr>
+            </a:outerShdw>
+          </a:effectLst>
+        </p:spPr>
+        <p:style>
+          <a:lnRef idx="0">
+            <a:scrgbClr r="0" g="0" b="0"/>
+          </a:lnRef>
+          <a:fillRef idx="0">
+            <a:scrgbClr r="0" g="0" b="0"/>
+          </a:fillRef>
+          <a:effectRef idx="0">
+            <a:scrgbClr r="0" g="0" b="0"/>
+          </a:effectRef>
+          <a:fontRef idx="minor">
+            <a:schemeClr val="tx1"/>
+          </a:fontRef>
+        </p:style>
+      </p:cxnSp>
+      <p:cxnSp>
+        <p:nvCxnSpPr>
+          <p:cNvPr id="48" name="直線矢印コネクタ 47">
+            <a:extLst>
+              <a:ext uri="{FF2B5EF4-FFF2-40B4-BE49-F238E27FC236}">
+                <a16:creationId xmlns:a16="http://schemas.microsoft.com/office/drawing/2014/main" id="{C5920188-2F1C-4756-B87D-3273BEC35D81}"/>
+              </a:ext>
+            </a:extLst>
+          </p:cNvPr>
+          <p:cNvCxnSpPr>
+            <a:cxnSpLocks/>
+            <a:endCxn id="5" idx="1"/>
+          </p:cNvCxnSpPr>
+          <p:nvPr/>
+        </p:nvCxnSpPr>
+        <p:spPr>
+          <a:xfrm>
+            <a:off x="201283" y="3316855"/>
+            <a:ext cx="442825" cy="0"/>
+          </a:xfrm>
+          <a:prstGeom prst="straightConnector1">
+            <a:avLst/>
+          </a:prstGeom>
+          <a:ln w="76200" cap="flat" cmpd="sng" algn="ctr">
+            <a:solidFill>
+              <a:schemeClr val="tx1"/>
+            </a:solidFill>
+            <a:prstDash val="solid"/>
+            <a:round/>
+            <a:headEnd type="none" w="med" len="med"/>
+            <a:tailEnd type="triangle" w="med" len="med"/>
+          </a:ln>
+          <a:effectLst>
+            <a:outerShdw blurRad="50800" dist="38100" dir="2700000" algn="tl" rotWithShape="0">
+              <a:prstClr val="black">
+                <a:alpha val="40000"/>
+              </a:prstClr>
+            </a:outerShdw>
+          </a:effectLst>
+        </p:spPr>
+        <p:style>
+          <a:lnRef idx="0">
+            <a:scrgbClr r="0" g="0" b="0"/>
+          </a:lnRef>
+          <a:fillRef idx="0">
+            <a:scrgbClr r="0" g="0" b="0"/>
+          </a:fillRef>
+          <a:effectRef idx="0">
+            <a:scrgbClr r="0" g="0" b="0"/>
+          </a:effectRef>
+          <a:fontRef idx="minor">
+            <a:schemeClr val="tx1"/>
+          </a:fontRef>
+        </p:style>
+      </p:cxnSp>
+      <p:sp>
+        <p:nvSpPr>
+          <p:cNvPr id="14" name="正方形/長方形 13">
+            <a:extLst>
+              <a:ext uri="{FF2B5EF4-FFF2-40B4-BE49-F238E27FC236}">
+                <a16:creationId xmlns:a16="http://schemas.microsoft.com/office/drawing/2014/main" id="{F2F27C0F-89E9-4975-86C9-32185A9E8870}"/>
+              </a:ext>
+            </a:extLst>
+          </p:cNvPr>
+          <p:cNvSpPr/>
+          <p:nvPr/>
+        </p:nvSpPr>
+        <p:spPr>
+          <a:xfrm>
+            <a:off x="644107" y="4584938"/>
+            <a:ext cx="1793672" cy="1268083"/>
+          </a:xfrm>
+          <a:prstGeom prst="rect">
+            <a:avLst/>
+          </a:prstGeom>
+          <a:effectLst>
+            <a:outerShdw blurRad="50800" dist="38100" dir="2700000" algn="tl" rotWithShape="0">
+              <a:prstClr val="black">
+                <a:alpha val="40000"/>
+              </a:prstClr>
+            </a:outerShdw>
+          </a:effectLst>
+        </p:spPr>
+        <p:style>
+          <a:lnRef idx="0">
+            <a:schemeClr val="accent5"/>
+          </a:lnRef>
+          <a:fillRef idx="3">
+            <a:schemeClr val="accent5"/>
+          </a:fillRef>
+          <a:effectRef idx="3">
+            <a:schemeClr val="accent5"/>
+          </a:effectRef>
+          <a:fontRef idx="minor">
+            <a:schemeClr val="lt1"/>
+          </a:fontRef>
+        </p:style>
+        <p:txBody>
+          <a:bodyPr rtlCol="0" anchor="ctr"/>
+          <a:lstStyle/>
+          <a:p>
+            <a:pPr algn="ctr"/>
+            <a:r>
+              <a:rPr kumimoji="1" lang="en-US" altLang="ja-JP" sz="8000" b="1" dirty="0">
+                <a:latin typeface="UD デジタル 教科書体 NK-B" panose="02020700000000000000" pitchFamily="18" charset="-128"/>
+                <a:ea typeface="UD デジタル 教科書体 NK-B" panose="02020700000000000000" pitchFamily="18" charset="-128"/>
+              </a:rPr>
+              <a:t>2</a:t>
+            </a:r>
+            <a:endParaRPr kumimoji="1" lang="ja-JP" altLang="en-US" sz="8000" b="1" dirty="0">
+              <a:latin typeface="UD デジタル 教科書体 NK-B" panose="02020700000000000000" pitchFamily="18" charset="-128"/>
+              <a:ea typeface="UD デジタル 教科書体 NK-B" panose="02020700000000000000" pitchFamily="18" charset="-128"/>
+            </a:endParaRPr>
+          </a:p>
+        </p:txBody>
+      </p:sp>
+      <p:sp>
+        <p:nvSpPr>
+          <p:cNvPr id="15" name="正方形/長方形 14">
+            <a:extLst>
+              <a:ext uri="{FF2B5EF4-FFF2-40B4-BE49-F238E27FC236}">
+                <a16:creationId xmlns:a16="http://schemas.microsoft.com/office/drawing/2014/main" id="{ECFE8929-4F79-45D7-AD77-D28F5BACCA74}"/>
+              </a:ext>
+            </a:extLst>
+          </p:cNvPr>
+          <p:cNvSpPr/>
+          <p:nvPr/>
+        </p:nvSpPr>
+        <p:spPr>
+          <a:xfrm>
+            <a:off x="3470963" y="4584938"/>
+            <a:ext cx="1793672" cy="1268083"/>
+          </a:xfrm>
+          <a:prstGeom prst="rect">
+            <a:avLst/>
+          </a:prstGeom>
+          <a:effectLst>
+            <a:outerShdw blurRad="50800" dist="38100" dir="2700000" algn="tl" rotWithShape="0">
+              <a:prstClr val="black">
+                <a:alpha val="40000"/>
+              </a:prstClr>
+            </a:outerShdw>
+          </a:effectLst>
+        </p:spPr>
+        <p:style>
+          <a:lnRef idx="0">
+            <a:schemeClr val="accent5"/>
+          </a:lnRef>
+          <a:fillRef idx="3">
+            <a:schemeClr val="accent5"/>
+          </a:fillRef>
+          <a:effectRef idx="3">
+            <a:schemeClr val="accent5"/>
+          </a:effectRef>
+          <a:fontRef idx="minor">
+            <a:schemeClr val="lt1"/>
+          </a:fontRef>
+        </p:style>
+        <p:txBody>
+          <a:bodyPr rtlCol="0" anchor="ctr"/>
+          <a:lstStyle/>
+          <a:p>
+            <a:pPr algn="ctr"/>
+            <a:r>
+              <a:rPr lang="en-US" altLang="ja-JP" sz="8000" b="1" dirty="0">
+                <a:latin typeface="UD デジタル 教科書体 NK-B" panose="02020700000000000000" pitchFamily="18" charset="-128"/>
+                <a:ea typeface="UD デジタル 教科書体 NK-B" panose="02020700000000000000" pitchFamily="18" charset="-128"/>
+              </a:rPr>
+              <a:t>4</a:t>
+            </a:r>
+            <a:endParaRPr kumimoji="1" lang="ja-JP" altLang="en-US" sz="8000" b="1" dirty="0">
+              <a:latin typeface="UD デジタル 教科書体 NK-B" panose="02020700000000000000" pitchFamily="18" charset="-128"/>
+              <a:ea typeface="UD デジタル 教科書体 NK-B" panose="02020700000000000000" pitchFamily="18" charset="-128"/>
+            </a:endParaRPr>
+          </a:p>
+        </p:txBody>
+      </p:sp>
+      <p:cxnSp>
+        <p:nvCxnSpPr>
+          <p:cNvPr id="16" name="直線矢印コネクタ 15">
+            <a:extLst>
+              <a:ext uri="{FF2B5EF4-FFF2-40B4-BE49-F238E27FC236}">
+                <a16:creationId xmlns:a16="http://schemas.microsoft.com/office/drawing/2014/main" id="{E0266EFD-9F9D-41F7-AEB3-B2ADF9A98250}"/>
+              </a:ext>
+            </a:extLst>
+          </p:cNvPr>
+          <p:cNvCxnSpPr>
+            <a:cxnSpLocks/>
+            <a:stCxn id="14" idx="3"/>
+            <a:endCxn id="15" idx="1"/>
+          </p:cNvCxnSpPr>
+          <p:nvPr/>
+        </p:nvCxnSpPr>
+        <p:spPr>
+          <a:xfrm>
+            <a:off x="2437779" y="5218980"/>
+            <a:ext cx="1033184" cy="0"/>
+          </a:xfrm>
+          <a:prstGeom prst="straightConnector1">
+            <a:avLst/>
+          </a:prstGeom>
+          <a:ln w="76200" cap="flat" cmpd="sng" algn="ctr">
+            <a:solidFill>
+              <a:schemeClr val="tx1"/>
+            </a:solidFill>
+            <a:prstDash val="solid"/>
+            <a:round/>
+            <a:headEnd type="none" w="med" len="med"/>
+            <a:tailEnd type="triangle" w="med" len="med"/>
+          </a:ln>
+          <a:effectLst>
+            <a:outerShdw blurRad="50800" dist="38100" dir="2700000" algn="tl" rotWithShape="0">
+              <a:prstClr val="black">
+                <a:alpha val="40000"/>
+              </a:prstClr>
+            </a:outerShdw>
+          </a:effectLst>
+        </p:spPr>
+        <p:style>
+          <a:lnRef idx="0">
+            <a:scrgbClr r="0" g="0" b="0"/>
+          </a:lnRef>
+          <a:fillRef idx="0">
+            <a:scrgbClr r="0" g="0" b="0"/>
+          </a:fillRef>
+          <a:effectRef idx="0">
+            <a:scrgbClr r="0" g="0" b="0"/>
+          </a:effectRef>
+          <a:fontRef idx="minor">
+            <a:schemeClr val="tx1"/>
+          </a:fontRef>
+        </p:style>
+      </p:cxnSp>
+      <p:cxnSp>
+        <p:nvCxnSpPr>
+          <p:cNvPr id="17" name="直線矢印コネクタ 16">
+            <a:extLst>
+              <a:ext uri="{FF2B5EF4-FFF2-40B4-BE49-F238E27FC236}">
+                <a16:creationId xmlns:a16="http://schemas.microsoft.com/office/drawing/2014/main" id="{61EA7629-A31C-4DD0-81E7-AB18BA56C015}"/>
+              </a:ext>
+            </a:extLst>
+          </p:cNvPr>
+          <p:cNvCxnSpPr>
+            <a:cxnSpLocks/>
+          </p:cNvCxnSpPr>
+          <p:nvPr/>
+        </p:nvCxnSpPr>
+        <p:spPr>
+          <a:xfrm>
+            <a:off x="5264635" y="5218980"/>
+            <a:ext cx="1096684" cy="0"/>
+          </a:xfrm>
+          <a:prstGeom prst="straightConnector1">
+            <a:avLst/>
+          </a:prstGeom>
+          <a:ln w="76200" cap="flat" cmpd="sng" algn="ctr">
+            <a:solidFill>
+              <a:schemeClr val="tx1"/>
+            </a:solidFill>
+            <a:prstDash val="solid"/>
+            <a:round/>
+            <a:headEnd type="none" w="med" len="med"/>
+            <a:tailEnd type="none" w="med" len="med"/>
+          </a:ln>
+          <a:effectLst>
+            <a:outerShdw blurRad="50800" dist="38100" dir="2700000" algn="tl" rotWithShape="0">
+              <a:prstClr val="black">
+                <a:alpha val="40000"/>
+              </a:prstClr>
+            </a:outerShdw>
+          </a:effectLst>
+        </p:spPr>
+        <p:style>
+          <a:lnRef idx="0">
+            <a:scrgbClr r="0" g="0" b="0"/>
+          </a:lnRef>
+          <a:fillRef idx="0">
+            <a:scrgbClr r="0" g="0" b="0"/>
+          </a:fillRef>
+          <a:effectRef idx="0">
+            <a:scrgbClr r="0" g="0" b="0"/>
+          </a:effectRef>
+          <a:fontRef idx="minor">
+            <a:schemeClr val="tx1"/>
+          </a:fontRef>
+        </p:style>
+      </p:cxnSp>
+      <p:cxnSp>
+        <p:nvCxnSpPr>
+          <p:cNvPr id="18" name="直線矢印コネクタ 17">
+            <a:extLst>
+              <a:ext uri="{FF2B5EF4-FFF2-40B4-BE49-F238E27FC236}">
+                <a16:creationId xmlns:a16="http://schemas.microsoft.com/office/drawing/2014/main" id="{3660AA39-2E09-42B0-94CA-527BDAEDBC1B}"/>
+              </a:ext>
+            </a:extLst>
+          </p:cNvPr>
+          <p:cNvCxnSpPr>
+            <a:cxnSpLocks/>
+          </p:cNvCxnSpPr>
+          <p:nvPr/>
+        </p:nvCxnSpPr>
+        <p:spPr>
+          <a:xfrm flipH="1" flipV="1">
+            <a:off x="6363193" y="3358551"/>
+            <a:ext cx="32050" cy="1903562"/>
+          </a:xfrm>
+          <a:prstGeom prst="straightConnector1">
+            <a:avLst/>
+          </a:prstGeom>
+          <a:ln w="76200" cap="flat" cmpd="sng" algn="ctr">
+            <a:solidFill>
+              <a:schemeClr val="tx1"/>
+            </a:solidFill>
+            <a:prstDash val="solid"/>
+            <a:round/>
+            <a:headEnd type="none" w="med" len="med"/>
+            <a:tailEnd type="triangle" w="med" len="med"/>
+          </a:ln>
+          <a:effectLst>
+            <a:outerShdw blurRad="50800" dist="38100" dir="2700000" algn="tl" rotWithShape="0">
+              <a:prstClr val="black">
+                <a:alpha val="40000"/>
+              </a:prstClr>
+            </a:outerShdw>
+          </a:effectLst>
+        </p:spPr>
+        <p:style>
+          <a:lnRef idx="0">
+            <a:scrgbClr r="0" g="0" b="0"/>
+          </a:lnRef>
+          <a:fillRef idx="0">
+            <a:scrgbClr r="0" g="0" b="0"/>
+          </a:fillRef>
+          <a:effectRef idx="0">
+            <a:scrgbClr r="0" g="0" b="0"/>
+          </a:effectRef>
+          <a:fontRef idx="minor">
+            <a:schemeClr val="tx1"/>
+          </a:fontRef>
+        </p:style>
+      </p:cxnSp>
+    </p:spTree>
+    <p:extLst>
+      <p:ext uri="{BB962C8B-B14F-4D97-AF65-F5344CB8AC3E}">
+        <p14:creationId xmlns:p14="http://schemas.microsoft.com/office/powerpoint/2010/main" val="859733955"/>
+      </p:ext>
+    </p:extLst>
+  </p:cSld>
+  <p:clrMapOvr>
+    <a:masterClrMapping/>
+  </p:clrMapOvr>
+</p:sld>
+</file>
+
+<file path=ppt/slides/slide14.xml><?xml version="1.0" encoding="utf-8"?>
+<p:sld xmlns:a="http://schemas.openxmlformats.org/drawingml/2006/main" xmlns:r="http://schemas.openxmlformats.org/officeDocument/2006/relationships" xmlns:p="http://schemas.openxmlformats.org/presentationml/2006/main">
+  <p:cSld>
+    <p:spTree>
+      <p:nvGrpSpPr>
+        <p:cNvPr id="1" name=""/>
+        <p:cNvGrpSpPr/>
+        <p:nvPr/>
+      </p:nvGrpSpPr>
+      <p:grpSpPr>
+        <a:xfrm>
+          <a:off x="0" y="0"/>
+          <a:ext cx="0" cy="0"/>
+          <a:chOff x="0" y="0"/>
+          <a:chExt cx="0" cy="0"/>
+        </a:xfrm>
+      </p:grpSpPr>
+      <p:sp>
+        <p:nvSpPr>
+          <p:cNvPr id="5" name="正方形/長方形 4">
+            <a:extLst>
+              <a:ext uri="{FF2B5EF4-FFF2-40B4-BE49-F238E27FC236}">
+                <a16:creationId xmlns:a16="http://schemas.microsoft.com/office/drawing/2014/main" id="{2945E7BB-73F3-4FED-9A34-2574AC1448F5}"/>
+              </a:ext>
+            </a:extLst>
+          </p:cNvPr>
+          <p:cNvSpPr/>
+          <p:nvPr/>
+        </p:nvSpPr>
+        <p:spPr>
+          <a:xfrm>
+            <a:off x="644108" y="2682813"/>
+            <a:ext cx="1793672" cy="1268083"/>
+          </a:xfrm>
+          <a:prstGeom prst="rect">
+            <a:avLst/>
+          </a:prstGeom>
+          <a:effectLst>
+            <a:outerShdw blurRad="50800" dist="38100" dir="2700000" algn="tl" rotWithShape="0">
+              <a:prstClr val="black">
+                <a:alpha val="40000"/>
+              </a:prstClr>
+            </a:outerShdw>
+          </a:effectLst>
+        </p:spPr>
+        <p:style>
+          <a:lnRef idx="0">
+            <a:schemeClr val="accent5"/>
+          </a:lnRef>
+          <a:fillRef idx="3">
+            <a:schemeClr val="accent5"/>
+          </a:fillRef>
+          <a:effectRef idx="3">
+            <a:schemeClr val="accent5"/>
+          </a:effectRef>
+          <a:fontRef idx="minor">
+            <a:schemeClr val="lt1"/>
+          </a:fontRef>
+        </p:style>
+        <p:txBody>
+          <a:bodyPr rtlCol="0" anchor="ctr"/>
+          <a:lstStyle/>
+          <a:p>
+            <a:pPr algn="ctr"/>
+            <a:r>
+              <a:rPr kumimoji="1" lang="en-US" altLang="ja-JP" sz="8000" b="1" dirty="0">
+                <a:latin typeface="UD デジタル 教科書体 NK-B" panose="02020700000000000000" pitchFamily="18" charset="-128"/>
+                <a:ea typeface="UD デジタル 教科書体 NK-B" panose="02020700000000000000" pitchFamily="18" charset="-128"/>
+              </a:rPr>
+              <a:t>1</a:t>
+            </a:r>
+            <a:endParaRPr kumimoji="1" lang="ja-JP" altLang="en-US" sz="8000" b="1" dirty="0">
+              <a:latin typeface="UD デジタル 教科書体 NK-B" panose="02020700000000000000" pitchFamily="18" charset="-128"/>
+              <a:ea typeface="UD デジタル 教科書体 NK-B" panose="02020700000000000000" pitchFamily="18" charset="-128"/>
+            </a:endParaRPr>
+          </a:p>
+        </p:txBody>
+      </p:sp>
+      <p:sp>
+        <p:nvSpPr>
+          <p:cNvPr id="7" name="正方形/長方形 6">
+            <a:extLst>
+              <a:ext uri="{FF2B5EF4-FFF2-40B4-BE49-F238E27FC236}">
+                <a16:creationId xmlns:a16="http://schemas.microsoft.com/office/drawing/2014/main" id="{BEAB9C1B-5A27-4809-B744-4C06523FF185}"/>
+              </a:ext>
+            </a:extLst>
+          </p:cNvPr>
+          <p:cNvSpPr/>
+          <p:nvPr/>
+        </p:nvSpPr>
+        <p:spPr>
+          <a:xfrm>
+            <a:off x="4648854" y="2682813"/>
+            <a:ext cx="1793672" cy="1268083"/>
+          </a:xfrm>
+          <a:prstGeom prst="rect">
+            <a:avLst/>
+          </a:prstGeom>
+          <a:effectLst>
+            <a:outerShdw blurRad="50800" dist="38100" dir="2700000" algn="tl" rotWithShape="0">
+              <a:prstClr val="black">
+                <a:alpha val="40000"/>
+              </a:prstClr>
+            </a:outerShdw>
+          </a:effectLst>
+        </p:spPr>
+        <p:style>
+          <a:lnRef idx="0">
+            <a:schemeClr val="accent5"/>
+          </a:lnRef>
+          <a:fillRef idx="3">
+            <a:schemeClr val="accent5"/>
+          </a:fillRef>
+          <a:effectRef idx="3">
+            <a:schemeClr val="accent5"/>
+          </a:effectRef>
+          <a:fontRef idx="minor">
+            <a:schemeClr val="lt1"/>
+          </a:fontRef>
+        </p:style>
+        <p:txBody>
+          <a:bodyPr rtlCol="0" anchor="ctr"/>
+          <a:lstStyle/>
+          <a:p>
+            <a:pPr algn="ctr"/>
+            <a:r>
+              <a:rPr kumimoji="1" lang="en-US" altLang="ja-JP" sz="8000" b="1" dirty="0">
+                <a:latin typeface="UD デジタル 教科書体 NK-B" panose="02020700000000000000" pitchFamily="18" charset="-128"/>
+                <a:ea typeface="UD デジタル 教科書体 NK-B" panose="02020700000000000000" pitchFamily="18" charset="-128"/>
+              </a:rPr>
+              <a:t>2</a:t>
+            </a:r>
+            <a:endParaRPr kumimoji="1" lang="ja-JP" altLang="en-US" sz="8000" b="1" dirty="0">
+              <a:latin typeface="UD デジタル 教科書体 NK-B" panose="02020700000000000000" pitchFamily="18" charset="-128"/>
+              <a:ea typeface="UD デジタル 教科書体 NK-B" panose="02020700000000000000" pitchFamily="18" charset="-128"/>
+            </a:endParaRPr>
+          </a:p>
+        </p:txBody>
+      </p:sp>
+      <p:sp>
+        <p:nvSpPr>
+          <p:cNvPr id="8" name="正方形/長方形 7">
+            <a:extLst>
+              <a:ext uri="{FF2B5EF4-FFF2-40B4-BE49-F238E27FC236}">
+                <a16:creationId xmlns:a16="http://schemas.microsoft.com/office/drawing/2014/main" id="{8477999C-749C-4B3B-9133-612996066ABD}"/>
+              </a:ext>
+            </a:extLst>
+          </p:cNvPr>
+          <p:cNvSpPr/>
+          <p:nvPr/>
+        </p:nvSpPr>
+        <p:spPr>
+          <a:xfrm>
+            <a:off x="7475710" y="2682813"/>
+            <a:ext cx="1793672" cy="1268083"/>
+          </a:xfrm>
+          <a:prstGeom prst="rect">
+            <a:avLst/>
+          </a:prstGeom>
+          <a:effectLst>
+            <a:outerShdw blurRad="50800" dist="38100" dir="2700000" algn="tl" rotWithShape="0">
+              <a:prstClr val="black">
+                <a:alpha val="40000"/>
+              </a:prstClr>
+            </a:outerShdw>
+          </a:effectLst>
+        </p:spPr>
+        <p:style>
+          <a:lnRef idx="0">
+            <a:schemeClr val="accent5"/>
+          </a:lnRef>
+          <a:fillRef idx="3">
+            <a:schemeClr val="accent5"/>
+          </a:fillRef>
+          <a:effectRef idx="3">
+            <a:schemeClr val="accent5"/>
+          </a:effectRef>
+          <a:fontRef idx="minor">
+            <a:schemeClr val="lt1"/>
+          </a:fontRef>
+        </p:style>
+        <p:txBody>
+          <a:bodyPr rtlCol="0" anchor="ctr"/>
+          <a:lstStyle/>
+          <a:p>
+            <a:pPr algn="ctr"/>
+            <a:r>
+              <a:rPr lang="en-US" altLang="ja-JP" sz="8000" b="1" dirty="0">
+                <a:latin typeface="UD デジタル 教科書体 NK-B" panose="02020700000000000000" pitchFamily="18" charset="-128"/>
+                <a:ea typeface="UD デジタル 教科書体 NK-B" panose="02020700000000000000" pitchFamily="18" charset="-128"/>
+              </a:rPr>
+              <a:t>4</a:t>
+            </a:r>
+            <a:endParaRPr kumimoji="1" lang="ja-JP" altLang="en-US" sz="8000" b="1" dirty="0">
+              <a:latin typeface="UD デジタル 教科書体 NK-B" panose="02020700000000000000" pitchFamily="18" charset="-128"/>
+              <a:ea typeface="UD デジタル 教科書体 NK-B" panose="02020700000000000000" pitchFamily="18" charset="-128"/>
+            </a:endParaRPr>
+          </a:p>
+        </p:txBody>
+      </p:sp>
+      <p:cxnSp>
+        <p:nvCxnSpPr>
+          <p:cNvPr id="12" name="直線矢印コネクタ 11">
+            <a:extLst>
+              <a:ext uri="{FF2B5EF4-FFF2-40B4-BE49-F238E27FC236}">
+                <a16:creationId xmlns:a16="http://schemas.microsoft.com/office/drawing/2014/main" id="{A284AA8C-C9F4-4E8D-9920-B322467743DC}"/>
+              </a:ext>
+            </a:extLst>
+          </p:cNvPr>
+          <p:cNvCxnSpPr>
+            <a:cxnSpLocks/>
+            <a:stCxn id="7" idx="3"/>
+            <a:endCxn id="8" idx="1"/>
+          </p:cNvCxnSpPr>
+          <p:nvPr/>
+        </p:nvCxnSpPr>
+        <p:spPr>
+          <a:xfrm>
+            <a:off x="6442526" y="3316855"/>
+            <a:ext cx="1033184" cy="0"/>
+          </a:xfrm>
+          <a:prstGeom prst="straightConnector1">
+            <a:avLst/>
+          </a:prstGeom>
+          <a:ln w="76200" cap="flat" cmpd="sng" algn="ctr">
+            <a:solidFill>
+              <a:schemeClr val="tx1"/>
+            </a:solidFill>
+            <a:prstDash val="solid"/>
+            <a:round/>
+            <a:headEnd type="none" w="med" len="med"/>
+            <a:tailEnd type="triangle" w="med" len="med"/>
+          </a:ln>
+          <a:effectLst>
+            <a:outerShdw blurRad="50800" dist="38100" dir="2700000" algn="tl" rotWithShape="0">
+              <a:prstClr val="black">
+                <a:alpha val="40000"/>
+              </a:prstClr>
+            </a:outerShdw>
+          </a:effectLst>
+        </p:spPr>
+        <p:style>
+          <a:lnRef idx="0">
+            <a:scrgbClr r="0" g="0" b="0"/>
+          </a:lnRef>
+          <a:fillRef idx="0">
+            <a:scrgbClr r="0" g="0" b="0"/>
+          </a:fillRef>
+          <a:effectRef idx="0">
+            <a:scrgbClr r="0" g="0" b="0"/>
+          </a:effectRef>
+          <a:fontRef idx="minor">
+            <a:schemeClr val="tx1"/>
+          </a:fontRef>
+        </p:style>
+      </p:cxnSp>
+      <p:cxnSp>
+        <p:nvCxnSpPr>
+          <p:cNvPr id="39" name="直線矢印コネクタ 38">
+            <a:extLst>
+              <a:ext uri="{FF2B5EF4-FFF2-40B4-BE49-F238E27FC236}">
+                <a16:creationId xmlns:a16="http://schemas.microsoft.com/office/drawing/2014/main" id="{33F04FCE-1F02-40B5-86BE-26E07F37F91F}"/>
+              </a:ext>
+            </a:extLst>
+          </p:cNvPr>
+          <p:cNvCxnSpPr>
+            <a:cxnSpLocks/>
+          </p:cNvCxnSpPr>
+          <p:nvPr/>
+        </p:nvCxnSpPr>
+        <p:spPr>
+          <a:xfrm flipV="1">
+            <a:off x="2940602" y="2241162"/>
+            <a:ext cx="0" cy="1075694"/>
+          </a:xfrm>
+          <a:prstGeom prst="straightConnector1">
+            <a:avLst/>
+          </a:prstGeom>
+          <a:ln w="76200" cap="flat" cmpd="sng" algn="ctr">
+            <a:solidFill>
+              <a:schemeClr val="tx1"/>
+            </a:solidFill>
+            <a:prstDash val="solid"/>
+            <a:round/>
+            <a:headEnd type="none" w="med" len="med"/>
+            <a:tailEnd type="none" w="med" len="med"/>
+          </a:ln>
+          <a:effectLst>
+            <a:outerShdw blurRad="50800" dist="38100" dir="2700000" algn="tl" rotWithShape="0">
+              <a:prstClr val="black">
+                <a:alpha val="40000"/>
+              </a:prstClr>
+            </a:outerShdw>
+          </a:effectLst>
+        </p:spPr>
+        <p:style>
+          <a:lnRef idx="0">
+            <a:scrgbClr r="0" g="0" b="0"/>
+          </a:lnRef>
+          <a:fillRef idx="0">
+            <a:scrgbClr r="0" g="0" b="0"/>
+          </a:fillRef>
+          <a:effectRef idx="0">
+            <a:scrgbClr r="0" g="0" b="0"/>
+          </a:effectRef>
+          <a:fontRef idx="minor">
+            <a:schemeClr val="tx1"/>
+          </a:fontRef>
+        </p:style>
+      </p:cxnSp>
+      <p:cxnSp>
+        <p:nvCxnSpPr>
+          <p:cNvPr id="42" name="直線矢印コネクタ 41">
+            <a:extLst>
+              <a:ext uri="{FF2B5EF4-FFF2-40B4-BE49-F238E27FC236}">
+                <a16:creationId xmlns:a16="http://schemas.microsoft.com/office/drawing/2014/main" id="{DE69DE8A-FEE5-499D-A848-DEC3D15E6DC9}"/>
+              </a:ext>
+            </a:extLst>
+          </p:cNvPr>
+          <p:cNvCxnSpPr>
+            <a:cxnSpLocks/>
+          </p:cNvCxnSpPr>
+          <p:nvPr/>
+        </p:nvCxnSpPr>
+        <p:spPr>
+          <a:xfrm flipH="1">
+            <a:off x="201283" y="2277373"/>
+            <a:ext cx="2770517" cy="1"/>
+          </a:xfrm>
+          <a:prstGeom prst="straightConnector1">
+            <a:avLst/>
+          </a:prstGeom>
+          <a:ln w="76200" cap="flat" cmpd="sng" algn="ctr">
+            <a:solidFill>
+              <a:schemeClr val="tx1"/>
+            </a:solidFill>
+            <a:prstDash val="solid"/>
+            <a:round/>
+            <a:headEnd type="none" w="med" len="med"/>
+            <a:tailEnd type="none" w="med" len="med"/>
+          </a:ln>
+          <a:effectLst>
+            <a:outerShdw blurRad="50800" dist="38100" dir="2700000" algn="tl" rotWithShape="0">
+              <a:prstClr val="black">
+                <a:alpha val="40000"/>
+              </a:prstClr>
+            </a:outerShdw>
+          </a:effectLst>
+        </p:spPr>
+        <p:style>
+          <a:lnRef idx="0">
+            <a:scrgbClr r="0" g="0" b="0"/>
+          </a:lnRef>
+          <a:fillRef idx="0">
+            <a:scrgbClr r="0" g="0" b="0"/>
+          </a:fillRef>
+          <a:effectRef idx="0">
+            <a:scrgbClr r="0" g="0" b="0"/>
+          </a:effectRef>
+          <a:fontRef idx="minor">
+            <a:schemeClr val="tx1"/>
+          </a:fontRef>
+        </p:style>
+      </p:cxnSp>
+      <p:cxnSp>
+        <p:nvCxnSpPr>
+          <p:cNvPr id="45" name="直線矢印コネクタ 44">
+            <a:extLst>
+              <a:ext uri="{FF2B5EF4-FFF2-40B4-BE49-F238E27FC236}">
+                <a16:creationId xmlns:a16="http://schemas.microsoft.com/office/drawing/2014/main" id="{19CED10B-C49D-4E17-9E9F-D9E6C58E7685}"/>
+              </a:ext>
+            </a:extLst>
+          </p:cNvPr>
+          <p:cNvCxnSpPr>
+            <a:cxnSpLocks/>
+          </p:cNvCxnSpPr>
+          <p:nvPr/>
+        </p:nvCxnSpPr>
+        <p:spPr>
+          <a:xfrm>
+            <a:off x="201283" y="2241161"/>
+            <a:ext cx="0" cy="1117390"/>
+          </a:xfrm>
+          <a:prstGeom prst="straightConnector1">
+            <a:avLst/>
+          </a:prstGeom>
+          <a:ln w="76200" cap="flat" cmpd="sng" algn="ctr">
+            <a:solidFill>
+              <a:schemeClr val="tx1"/>
+            </a:solidFill>
+            <a:prstDash val="solid"/>
+            <a:round/>
+            <a:headEnd type="none" w="med" len="med"/>
+            <a:tailEnd type="none" w="med" len="med"/>
+          </a:ln>
+          <a:effectLst>
+            <a:outerShdw blurRad="50800" dist="38100" dir="2700000" algn="tl" rotWithShape="0">
+              <a:prstClr val="black">
+                <a:alpha val="40000"/>
+              </a:prstClr>
+            </a:outerShdw>
+          </a:effectLst>
+        </p:spPr>
+        <p:style>
+          <a:lnRef idx="0">
+            <a:scrgbClr r="0" g="0" b="0"/>
+          </a:lnRef>
+          <a:fillRef idx="0">
+            <a:scrgbClr r="0" g="0" b="0"/>
+          </a:fillRef>
+          <a:effectRef idx="0">
+            <a:scrgbClr r="0" g="0" b="0"/>
+          </a:effectRef>
+          <a:fontRef idx="minor">
+            <a:schemeClr val="tx1"/>
+          </a:fontRef>
+        </p:style>
+      </p:cxnSp>
+      <p:cxnSp>
+        <p:nvCxnSpPr>
+          <p:cNvPr id="48" name="直線矢印コネクタ 47">
+            <a:extLst>
+              <a:ext uri="{FF2B5EF4-FFF2-40B4-BE49-F238E27FC236}">
+                <a16:creationId xmlns:a16="http://schemas.microsoft.com/office/drawing/2014/main" id="{C5920188-2F1C-4756-B87D-3273BEC35D81}"/>
+              </a:ext>
+            </a:extLst>
+          </p:cNvPr>
+          <p:cNvCxnSpPr>
+            <a:cxnSpLocks/>
+            <a:endCxn id="5" idx="1"/>
+          </p:cNvCxnSpPr>
+          <p:nvPr/>
+        </p:nvCxnSpPr>
+        <p:spPr>
+          <a:xfrm>
+            <a:off x="201283" y="3316855"/>
+            <a:ext cx="442825" cy="0"/>
+          </a:xfrm>
+          <a:prstGeom prst="straightConnector1">
+            <a:avLst/>
+          </a:prstGeom>
+          <a:ln w="76200" cap="flat" cmpd="sng" algn="ctr">
+            <a:solidFill>
+              <a:schemeClr val="tx1"/>
+            </a:solidFill>
+            <a:prstDash val="solid"/>
+            <a:round/>
+            <a:headEnd type="none" w="med" len="med"/>
+            <a:tailEnd type="triangle" w="med" len="med"/>
+          </a:ln>
+          <a:effectLst>
+            <a:outerShdw blurRad="50800" dist="38100" dir="2700000" algn="tl" rotWithShape="0">
+              <a:prstClr val="black">
+                <a:alpha val="40000"/>
+              </a:prstClr>
+            </a:outerShdw>
+          </a:effectLst>
+        </p:spPr>
+        <p:style>
+          <a:lnRef idx="0">
+            <a:scrgbClr r="0" g="0" b="0"/>
+          </a:lnRef>
+          <a:fillRef idx="0">
+            <a:scrgbClr r="0" g="0" b="0"/>
+          </a:fillRef>
+          <a:effectRef idx="0">
+            <a:scrgbClr r="0" g="0" b="0"/>
+          </a:effectRef>
+          <a:fontRef idx="minor">
+            <a:schemeClr val="tx1"/>
+          </a:fontRef>
+        </p:style>
+      </p:cxnSp>
+      <p:sp>
+        <p:nvSpPr>
+          <p:cNvPr id="2" name="正方形/長方形 1">
+            <a:extLst>
+              <a:ext uri="{FF2B5EF4-FFF2-40B4-BE49-F238E27FC236}">
+                <a16:creationId xmlns:a16="http://schemas.microsoft.com/office/drawing/2014/main" id="{239CCDEA-DA7F-4405-86D7-DB2D741D5C44}"/>
+              </a:ext>
+            </a:extLst>
+          </p:cNvPr>
+          <p:cNvSpPr/>
+          <p:nvPr/>
+        </p:nvSpPr>
+        <p:spPr>
+          <a:xfrm>
+            <a:off x="7475710" y="4663529"/>
+            <a:ext cx="1793672" cy="1268083"/>
+          </a:xfrm>
+          <a:prstGeom prst="rect">
+            <a:avLst/>
+          </a:prstGeom>
+          <a:effectLst>
+            <a:outerShdw blurRad="50800" dist="38100" dir="2700000" algn="tl" rotWithShape="0">
+              <a:prstClr val="black">
+                <a:alpha val="40000"/>
+              </a:prstClr>
+            </a:outerShdw>
+          </a:effectLst>
+        </p:spPr>
+        <p:style>
+          <a:lnRef idx="0">
+            <a:schemeClr val="accent5"/>
+          </a:lnRef>
+          <a:fillRef idx="3">
+            <a:schemeClr val="accent5"/>
+          </a:fillRef>
+          <a:effectRef idx="3">
+            <a:schemeClr val="accent5"/>
+          </a:effectRef>
+          <a:fontRef idx="minor">
+            <a:schemeClr val="lt1"/>
+          </a:fontRef>
+        </p:style>
+        <p:txBody>
+          <a:bodyPr rtlCol="0" anchor="ctr"/>
+          <a:lstStyle/>
+          <a:p>
+            <a:pPr algn="ctr"/>
+            <a:r>
+              <a:rPr kumimoji="1" lang="en-US" altLang="ja-JP" sz="8000" b="1" dirty="0">
+                <a:latin typeface="UD デジタル 教科書体 NK-B" panose="02020700000000000000" pitchFamily="18" charset="-128"/>
+                <a:ea typeface="UD デジタル 教科書体 NK-B" panose="02020700000000000000" pitchFamily="18" charset="-128"/>
+              </a:rPr>
+              <a:t>3</a:t>
+            </a:r>
+            <a:endParaRPr kumimoji="1" lang="ja-JP" altLang="en-US" sz="8000" b="1" dirty="0">
+              <a:latin typeface="UD デジタル 教科書体 NK-B" panose="02020700000000000000" pitchFamily="18" charset="-128"/>
+              <a:ea typeface="UD デジタル 教科書体 NK-B" panose="02020700000000000000" pitchFamily="18" charset="-128"/>
+            </a:endParaRPr>
+          </a:p>
+        </p:txBody>
+      </p:sp>
+      <p:cxnSp>
+        <p:nvCxnSpPr>
+          <p:cNvPr id="22" name="直線矢印コネクタ 21">
+            <a:extLst>
+              <a:ext uri="{FF2B5EF4-FFF2-40B4-BE49-F238E27FC236}">
+                <a16:creationId xmlns:a16="http://schemas.microsoft.com/office/drawing/2014/main" id="{08EADA87-3C68-45F1-8B12-F6E05A111A49}"/>
+              </a:ext>
+            </a:extLst>
+          </p:cNvPr>
+          <p:cNvCxnSpPr>
+            <a:cxnSpLocks/>
+          </p:cNvCxnSpPr>
+          <p:nvPr/>
+        </p:nvCxnSpPr>
+        <p:spPr>
+          <a:xfrm>
+            <a:off x="2437780" y="3316855"/>
+            <a:ext cx="2211074" cy="0"/>
+          </a:xfrm>
+          <a:prstGeom prst="straightConnector1">
+            <a:avLst/>
+          </a:prstGeom>
+          <a:ln w="76200" cap="flat" cmpd="sng" algn="ctr">
+            <a:solidFill>
+              <a:schemeClr val="tx1"/>
+            </a:solidFill>
+            <a:prstDash val="solid"/>
+            <a:round/>
+            <a:headEnd type="none" w="med" len="med"/>
+            <a:tailEnd type="triangle" w="med" len="med"/>
+          </a:ln>
+          <a:effectLst>
+            <a:outerShdw blurRad="50800" dist="38100" dir="2700000" algn="tl" rotWithShape="0">
+              <a:prstClr val="black">
+                <a:alpha val="40000"/>
+              </a:prstClr>
+            </a:outerShdw>
+          </a:effectLst>
+        </p:spPr>
+        <p:style>
+          <a:lnRef idx="0">
+            <a:scrgbClr r="0" g="0" b="0"/>
+          </a:lnRef>
+          <a:fillRef idx="0">
+            <a:scrgbClr r="0" g="0" b="0"/>
+          </a:fillRef>
+          <a:effectRef idx="0">
+            <a:scrgbClr r="0" g="0" b="0"/>
+          </a:effectRef>
+          <a:fontRef idx="minor">
+            <a:schemeClr val="tx1"/>
+          </a:fontRef>
+        </p:style>
+      </p:cxnSp>
+      <p:cxnSp>
+        <p:nvCxnSpPr>
+          <p:cNvPr id="19" name="直線矢印コネクタ 18">
+            <a:extLst>
+              <a:ext uri="{FF2B5EF4-FFF2-40B4-BE49-F238E27FC236}">
+                <a16:creationId xmlns:a16="http://schemas.microsoft.com/office/drawing/2014/main" id="{2778E5EB-BE95-4876-411E-BB71CB1AD6C9}"/>
+              </a:ext>
+            </a:extLst>
+          </p:cNvPr>
+          <p:cNvCxnSpPr>
+            <a:cxnSpLocks/>
+          </p:cNvCxnSpPr>
+          <p:nvPr/>
+        </p:nvCxnSpPr>
+        <p:spPr>
+          <a:xfrm flipV="1">
+            <a:off x="9269382" y="5297572"/>
+            <a:ext cx="1082900" cy="1"/>
+          </a:xfrm>
+          <a:prstGeom prst="straightConnector1">
+            <a:avLst/>
+          </a:prstGeom>
+          <a:ln w="76200" cap="flat" cmpd="sng" algn="ctr">
+            <a:solidFill>
+              <a:schemeClr val="tx1"/>
+            </a:solidFill>
+            <a:prstDash val="solid"/>
+            <a:round/>
+            <a:headEnd type="none" w="med" len="med"/>
+            <a:tailEnd type="triangle" w="med" len="med"/>
+          </a:ln>
+          <a:effectLst>
+            <a:outerShdw blurRad="50800" dist="38100" dir="2700000" algn="tl" rotWithShape="0">
+              <a:prstClr val="black">
+                <a:alpha val="40000"/>
+              </a:prstClr>
+            </a:outerShdw>
+          </a:effectLst>
+        </p:spPr>
+        <p:style>
+          <a:lnRef idx="0">
+            <a:scrgbClr r="0" g="0" b="0"/>
+          </a:lnRef>
+          <a:fillRef idx="0">
+            <a:scrgbClr r="0" g="0" b="0"/>
+          </a:fillRef>
+          <a:effectRef idx="0">
+            <a:scrgbClr r="0" g="0" b="0"/>
+          </a:effectRef>
+          <a:fontRef idx="minor">
+            <a:schemeClr val="tx1"/>
+          </a:fontRef>
+        </p:style>
+      </p:cxnSp>
+      <p:cxnSp>
+        <p:nvCxnSpPr>
+          <p:cNvPr id="20" name="直線矢印コネクタ 19">
+            <a:extLst>
+              <a:ext uri="{FF2B5EF4-FFF2-40B4-BE49-F238E27FC236}">
+                <a16:creationId xmlns:a16="http://schemas.microsoft.com/office/drawing/2014/main" id="{56CDC865-F7EC-134E-9B6E-14D508029523}"/>
+              </a:ext>
+            </a:extLst>
+          </p:cNvPr>
+          <p:cNvCxnSpPr>
+            <a:cxnSpLocks/>
+          </p:cNvCxnSpPr>
+          <p:nvPr/>
+        </p:nvCxnSpPr>
+        <p:spPr>
+          <a:xfrm flipV="1">
+            <a:off x="10352282" y="3294536"/>
+            <a:ext cx="0" cy="2030838"/>
+          </a:xfrm>
+          <a:prstGeom prst="straightConnector1">
+            <a:avLst/>
+          </a:prstGeom>
+          <a:ln w="76200" cap="flat" cmpd="sng" algn="ctr">
+            <a:solidFill>
+              <a:schemeClr val="tx1"/>
+            </a:solidFill>
+            <a:prstDash val="solid"/>
+            <a:round/>
+            <a:headEnd type="none" w="med" len="med"/>
+            <a:tailEnd type="none" w="med" len="med"/>
+          </a:ln>
+          <a:effectLst>
+            <a:outerShdw blurRad="50800" dist="38100" dir="2700000" algn="tl" rotWithShape="0">
+              <a:prstClr val="black">
+                <a:alpha val="40000"/>
+              </a:prstClr>
+            </a:outerShdw>
+          </a:effectLst>
+        </p:spPr>
+        <p:style>
+          <a:lnRef idx="0">
+            <a:scrgbClr r="0" g="0" b="0"/>
+          </a:lnRef>
+          <a:fillRef idx="0">
+            <a:scrgbClr r="0" g="0" b="0"/>
+          </a:fillRef>
+          <a:effectRef idx="0">
+            <a:scrgbClr r="0" g="0" b="0"/>
+          </a:effectRef>
+          <a:fontRef idx="minor">
+            <a:schemeClr val="tx1"/>
+          </a:fontRef>
+        </p:style>
+      </p:cxnSp>
+      <p:cxnSp>
+        <p:nvCxnSpPr>
+          <p:cNvPr id="21" name="直線矢印コネクタ 20">
+            <a:extLst>
+              <a:ext uri="{FF2B5EF4-FFF2-40B4-BE49-F238E27FC236}">
+                <a16:creationId xmlns:a16="http://schemas.microsoft.com/office/drawing/2014/main" id="{5B86409F-E85C-F3D4-BADD-CED202CDDDC2}"/>
+              </a:ext>
+            </a:extLst>
+          </p:cNvPr>
+          <p:cNvCxnSpPr>
+            <a:cxnSpLocks/>
+          </p:cNvCxnSpPr>
+          <p:nvPr/>
+        </p:nvCxnSpPr>
+        <p:spPr>
+          <a:xfrm>
+            <a:off x="9269382" y="3316855"/>
+            <a:ext cx="1082900" cy="0"/>
+          </a:xfrm>
+          <a:prstGeom prst="straightConnector1">
+            <a:avLst/>
+          </a:prstGeom>
+          <a:ln w="76200" cap="flat" cmpd="sng" algn="ctr">
+            <a:solidFill>
+              <a:schemeClr val="tx1"/>
+            </a:solidFill>
+            <a:prstDash val="solid"/>
+            <a:round/>
+            <a:headEnd type="none" w="med" len="med"/>
+            <a:tailEnd type="triangle" w="med" len="med"/>
+          </a:ln>
+          <a:effectLst>
+            <a:outerShdw blurRad="50800" dist="38100" dir="2700000" algn="tl" rotWithShape="0">
+              <a:prstClr val="black">
+                <a:alpha val="40000"/>
+              </a:prstClr>
+            </a:outerShdw>
+          </a:effectLst>
+        </p:spPr>
+        <p:style>
+          <a:lnRef idx="0">
+            <a:scrgbClr r="0" g="0" b="0"/>
+          </a:lnRef>
+          <a:fillRef idx="0">
+            <a:scrgbClr r="0" g="0" b="0"/>
+          </a:fillRef>
+          <a:effectRef idx="0">
+            <a:scrgbClr r="0" g="0" b="0"/>
+          </a:effectRef>
+          <a:fontRef idx="minor">
+            <a:schemeClr val="tx1"/>
+          </a:fontRef>
+        </p:style>
+      </p:cxnSp>
+      <p:cxnSp>
+        <p:nvCxnSpPr>
+          <p:cNvPr id="23" name="直線矢印コネクタ 22">
+            <a:extLst>
+              <a:ext uri="{FF2B5EF4-FFF2-40B4-BE49-F238E27FC236}">
+                <a16:creationId xmlns:a16="http://schemas.microsoft.com/office/drawing/2014/main" id="{7E850EF5-14F8-944E-0B93-1C12B438FC53}"/>
+              </a:ext>
+            </a:extLst>
+          </p:cNvPr>
+          <p:cNvCxnSpPr>
+            <a:cxnSpLocks/>
+          </p:cNvCxnSpPr>
+          <p:nvPr/>
+        </p:nvCxnSpPr>
+        <p:spPr>
+          <a:xfrm flipV="1">
+            <a:off x="10385159" y="4299406"/>
+            <a:ext cx="1082900" cy="1"/>
+          </a:xfrm>
+          <a:prstGeom prst="straightConnector1">
+            <a:avLst/>
+          </a:prstGeom>
+          <a:ln w="76200" cap="flat" cmpd="sng" algn="ctr">
+            <a:solidFill>
+              <a:schemeClr val="tx1"/>
+            </a:solidFill>
+            <a:prstDash val="solid"/>
+            <a:round/>
+            <a:headEnd type="none" w="med" len="med"/>
+            <a:tailEnd type="triangle" w="med" len="med"/>
+          </a:ln>
+          <a:effectLst>
+            <a:outerShdw blurRad="50800" dist="38100" dir="2700000" algn="tl" rotWithShape="0">
+              <a:prstClr val="black">
+                <a:alpha val="40000"/>
+              </a:prstClr>
+            </a:outerShdw>
+          </a:effectLst>
+        </p:spPr>
+        <p:style>
+          <a:lnRef idx="0">
+            <a:scrgbClr r="0" g="0" b="0"/>
+          </a:lnRef>
+          <a:fillRef idx="0">
+            <a:scrgbClr r="0" g="0" b="0"/>
+          </a:fillRef>
+          <a:effectRef idx="0">
+            <a:scrgbClr r="0" g="0" b="0"/>
+          </a:effectRef>
+          <a:fontRef idx="minor">
+            <a:schemeClr val="tx1"/>
+          </a:fontRef>
+        </p:style>
+      </p:cxnSp>
+    </p:spTree>
+    <p:extLst>
+      <p:ext uri="{BB962C8B-B14F-4D97-AF65-F5344CB8AC3E}">
+        <p14:creationId xmlns:p14="http://schemas.microsoft.com/office/powerpoint/2010/main" val="999428449"/>
       </p:ext>
     </p:extLst>
   </p:cSld>

</xml_diff>